<commit_message>
National Storage Solution Update
Added a slide to the national storage solution presentation to include the helpdesk email.
</commit_message>
<xml_diff>
--- a/05_National_storage_infrastructures.pptx
+++ b/05_National_storage_infrastructures.pptx
@@ -5,7 +5,7 @@
     <p:sldMasterId id="2147483660" r:id="rId1"/>
   </p:sldMasterIdLst>
   <p:notesMasterIdLst>
-    <p:notesMasterId r:id="rId22"/>
+    <p:notesMasterId r:id="rId23"/>
   </p:notesMasterIdLst>
   <p:sldIdLst>
     <p:sldId id="256" r:id="rId2"/>
@@ -28,6 +28,7 @@
     <p:sldId id="481" r:id="rId19"/>
     <p:sldId id="486" r:id="rId20"/>
     <p:sldId id="485" r:id="rId21"/>
+    <p:sldId id="492" r:id="rId22"/>
   </p:sldIdLst>
   <p:sldSz cx="12192000" cy="6858000"/>
   <p:notesSz cx="7315200" cy="9601200"/>
@@ -241,7 +242,7 @@
           <a:p>
             <a:fld id="{48DFFBC8-A418-6444-A1F2-AF3DCBD12C89}" type="datetimeFigureOut">
               <a:rPr lang="en-GB" smtClean="0"/>
-              <a:t>21/08/2023</a:t>
+              <a:t>05/06/2024</a:t>
             </a:fld>
             <a:endParaRPr lang="en-GB"/>
           </a:p>
@@ -2791,14 +2792,14 @@
           </a:ln>
           <a:extLst>
             <a:ext uri="{909E8E84-426E-40dd-AFC4-6F175D3DCCD1}">
-              <a14:hiddenFill xmlns="" xmlns:a14="http://schemas.microsoft.com/office/drawing/2010/main">
+              <a14:hiddenFill xmlns:a14="http://schemas.microsoft.com/office/drawing/2010/main" xmlns="">
                 <a:solidFill>
                   <a:srgbClr val="FFFFFF"/>
                 </a:solidFill>
               </a14:hiddenFill>
             </a:ext>
             <a:ext uri="{91240B29-F687-4f45-9708-019B960494DF}">
-              <a14:hiddenLine xmlns="" xmlns:a14="http://schemas.microsoft.com/office/drawing/2010/main" w="9525">
+              <a14:hiddenLine xmlns:a14="http://schemas.microsoft.com/office/drawing/2010/main" xmlns="" w="9525">
                 <a:solidFill>
                   <a:srgbClr val="000000"/>
                 </a:solidFill>
@@ -3103,14 +3104,14 @@
           </a:ln>
           <a:extLst>
             <a:ext uri="{909E8E84-426E-40dd-AFC4-6F175D3DCCD1}">
-              <a14:hiddenFill xmlns="" xmlns:a14="http://schemas.microsoft.com/office/drawing/2010/main">
+              <a14:hiddenFill xmlns:a14="http://schemas.microsoft.com/office/drawing/2010/main" xmlns="">
                 <a:solidFill>
                   <a:srgbClr val="FFFFFF"/>
                 </a:solidFill>
               </a14:hiddenFill>
             </a:ext>
             <a:ext uri="{91240B29-F687-4f45-9708-019B960494DF}">
-              <a14:hiddenLine xmlns="" xmlns:a14="http://schemas.microsoft.com/office/drawing/2010/main" w="9525">
+              <a14:hiddenLine xmlns:a14="http://schemas.microsoft.com/office/drawing/2010/main" xmlns="" w="9525">
                 <a:solidFill>
                   <a:srgbClr val="000000"/>
                 </a:solidFill>
@@ -3144,14 +3145,14 @@
           </a:ln>
           <a:extLst>
             <a:ext uri="{909E8E84-426E-40dd-AFC4-6F175D3DCCD1}">
-              <a14:hiddenFill xmlns="" xmlns:a14="http://schemas.microsoft.com/office/drawing/2010/main">
+              <a14:hiddenFill xmlns:a14="http://schemas.microsoft.com/office/drawing/2010/main" xmlns="">
                 <a:solidFill>
                   <a:srgbClr val="FFFFFF"/>
                 </a:solidFill>
               </a14:hiddenFill>
             </a:ext>
             <a:ext uri="{91240B29-F687-4f45-9708-019B960494DF}">
-              <a14:hiddenLine xmlns="" xmlns:a14="http://schemas.microsoft.com/office/drawing/2010/main" w="9525">
+              <a14:hiddenLine xmlns:a14="http://schemas.microsoft.com/office/drawing/2010/main" xmlns="" w="9525">
                 <a:solidFill>
                   <a:srgbClr val="000000"/>
                 </a:solidFill>
@@ -3356,14 +3357,14 @@
           </a:ln>
           <a:extLst>
             <a:ext uri="{909E8E84-426E-40dd-AFC4-6F175D3DCCD1}">
-              <a14:hiddenFill xmlns="" xmlns:a14="http://schemas.microsoft.com/office/drawing/2010/main">
+              <a14:hiddenFill xmlns:a14="http://schemas.microsoft.com/office/drawing/2010/main" xmlns="">
                 <a:solidFill>
                   <a:srgbClr val="FFFFFF"/>
                 </a:solidFill>
               </a14:hiddenFill>
             </a:ext>
             <a:ext uri="{91240B29-F687-4f45-9708-019B960494DF}">
-              <a14:hiddenLine xmlns="" xmlns:a14="http://schemas.microsoft.com/office/drawing/2010/main" w="9525">
+              <a14:hiddenLine xmlns:a14="http://schemas.microsoft.com/office/drawing/2010/main" xmlns="" w="9525">
                 <a:solidFill>
                   <a:srgbClr val="000000"/>
                 </a:solidFill>
@@ -3410,14 +3411,14 @@
           </a:ln>
           <a:extLst>
             <a:ext uri="{909E8E84-426E-40dd-AFC4-6F175D3DCCD1}">
-              <a14:hiddenFill xmlns="" xmlns:a14="http://schemas.microsoft.com/office/drawing/2010/main">
+              <a14:hiddenFill xmlns:a14="http://schemas.microsoft.com/office/drawing/2010/main" xmlns="">
                 <a:solidFill>
                   <a:srgbClr val="FFFFFF"/>
                 </a:solidFill>
               </a14:hiddenFill>
             </a:ext>
             <a:ext uri="{91240B29-F687-4f45-9708-019B960494DF}">
-              <a14:hiddenLine xmlns="" xmlns:a14="http://schemas.microsoft.com/office/drawing/2010/main" w="9525">
+              <a14:hiddenLine xmlns:a14="http://schemas.microsoft.com/office/drawing/2010/main" xmlns="" w="9525">
                 <a:solidFill>
                   <a:srgbClr val="000000"/>
                 </a:solidFill>
@@ -3451,14 +3452,14 @@
           </a:ln>
           <a:extLst>
             <a:ext uri="{909E8E84-426E-40dd-AFC4-6F175D3DCCD1}">
-              <a14:hiddenFill xmlns="" xmlns:a14="http://schemas.microsoft.com/office/drawing/2010/main">
+              <a14:hiddenFill xmlns:a14="http://schemas.microsoft.com/office/drawing/2010/main" xmlns="">
                 <a:solidFill>
                   <a:srgbClr val="FFFFFF"/>
                 </a:solidFill>
               </a14:hiddenFill>
             </a:ext>
             <a:ext uri="{91240B29-F687-4f45-9708-019B960494DF}">
-              <a14:hiddenLine xmlns="" xmlns:a14="http://schemas.microsoft.com/office/drawing/2010/main" w="9525">
+              <a14:hiddenLine xmlns:a14="http://schemas.microsoft.com/office/drawing/2010/main" xmlns="" w="9525">
                 <a:solidFill>
                   <a:srgbClr val="000000"/>
                 </a:solidFill>
@@ -3749,14 +3750,14 @@
           </a:ln>
           <a:extLst>
             <a:ext uri="{909E8E84-426E-40dd-AFC4-6F175D3DCCD1}">
-              <a14:hiddenFill xmlns="" xmlns:a14="http://schemas.microsoft.com/office/drawing/2010/main">
+              <a14:hiddenFill xmlns:a14="http://schemas.microsoft.com/office/drawing/2010/main" xmlns="">
                 <a:solidFill>
                   <a:srgbClr val="FFFFFF"/>
                 </a:solidFill>
               </a14:hiddenFill>
             </a:ext>
             <a:ext uri="{91240B29-F687-4f45-9708-019B960494DF}">
-              <a14:hiddenLine xmlns="" xmlns:a14="http://schemas.microsoft.com/office/drawing/2010/main" w="9525">
+              <a14:hiddenLine xmlns:a14="http://schemas.microsoft.com/office/drawing/2010/main" xmlns="" w="9525">
                 <a:solidFill>
                   <a:srgbClr val="000000"/>
                 </a:solidFill>
@@ -3803,14 +3804,14 @@
           </a:ln>
           <a:extLst>
             <a:ext uri="{909E8E84-426E-40dd-AFC4-6F175D3DCCD1}">
-              <a14:hiddenFill xmlns="" xmlns:a14="http://schemas.microsoft.com/office/drawing/2010/main">
+              <a14:hiddenFill xmlns:a14="http://schemas.microsoft.com/office/drawing/2010/main" xmlns="">
                 <a:solidFill>
                   <a:srgbClr val="FFFFFF"/>
                 </a:solidFill>
               </a14:hiddenFill>
             </a:ext>
             <a:ext uri="{91240B29-F687-4f45-9708-019B960494DF}">
-              <a14:hiddenLine xmlns="" xmlns:a14="http://schemas.microsoft.com/office/drawing/2010/main" w="9525">
+              <a14:hiddenLine xmlns:a14="http://schemas.microsoft.com/office/drawing/2010/main" xmlns="" w="9525">
                 <a:solidFill>
                   <a:srgbClr val="000000"/>
                 </a:solidFill>
@@ -3857,14 +3858,14 @@
           </a:ln>
           <a:extLst>
             <a:ext uri="{909E8E84-426E-40dd-AFC4-6F175D3DCCD1}">
-              <a14:hiddenFill xmlns="" xmlns:a14="http://schemas.microsoft.com/office/drawing/2010/main">
+              <a14:hiddenFill xmlns:a14="http://schemas.microsoft.com/office/drawing/2010/main" xmlns="">
                 <a:solidFill>
                   <a:srgbClr val="FFFFFF"/>
                 </a:solidFill>
               </a14:hiddenFill>
             </a:ext>
             <a:ext uri="{91240B29-F687-4f45-9708-019B960494DF}">
-              <a14:hiddenLine xmlns="" xmlns:a14="http://schemas.microsoft.com/office/drawing/2010/main" w="9525">
+              <a14:hiddenLine xmlns:a14="http://schemas.microsoft.com/office/drawing/2010/main" xmlns="" w="9525">
                 <a:solidFill>
                   <a:srgbClr val="000000"/>
                 </a:solidFill>
@@ -3898,14 +3899,14 @@
           </a:ln>
           <a:extLst>
             <a:ext uri="{909E8E84-426E-40dd-AFC4-6F175D3DCCD1}">
-              <a14:hiddenFill xmlns="" xmlns:a14="http://schemas.microsoft.com/office/drawing/2010/main">
+              <a14:hiddenFill xmlns:a14="http://schemas.microsoft.com/office/drawing/2010/main" xmlns="">
                 <a:solidFill>
                   <a:srgbClr val="FFFFFF"/>
                 </a:solidFill>
               </a14:hiddenFill>
             </a:ext>
             <a:ext uri="{91240B29-F687-4f45-9708-019B960494DF}">
-              <a14:hiddenLine xmlns="" xmlns:a14="http://schemas.microsoft.com/office/drawing/2010/main" w="9525">
+              <a14:hiddenLine xmlns:a14="http://schemas.microsoft.com/office/drawing/2010/main" xmlns="" w="9525">
                 <a:solidFill>
                   <a:srgbClr val="000000"/>
                 </a:solidFill>
@@ -4075,14 +4076,14 @@
           </a:ln>
           <a:extLst>
             <a:ext uri="{909E8E84-426E-40dd-AFC4-6F175D3DCCD1}">
-              <a14:hiddenFill xmlns="" xmlns:a14="http://schemas.microsoft.com/office/drawing/2010/main">
+              <a14:hiddenFill xmlns:a14="http://schemas.microsoft.com/office/drawing/2010/main" xmlns="">
                 <a:solidFill>
                   <a:srgbClr val="FFFFFF"/>
                 </a:solidFill>
               </a14:hiddenFill>
             </a:ext>
             <a:ext uri="{91240B29-F687-4f45-9708-019B960494DF}">
-              <a14:hiddenLine xmlns="" xmlns:a14="http://schemas.microsoft.com/office/drawing/2010/main" w="9525">
+              <a14:hiddenLine xmlns:a14="http://schemas.microsoft.com/office/drawing/2010/main" xmlns="" w="9525">
                 <a:solidFill>
                   <a:srgbClr val="000000"/>
                 </a:solidFill>
@@ -4276,14 +4277,14 @@
           </a:ln>
           <a:extLst>
             <a:ext uri="{909E8E84-426E-40dd-AFC4-6F175D3DCCD1}">
-              <a14:hiddenFill xmlns="" xmlns:a14="http://schemas.microsoft.com/office/drawing/2010/main">
+              <a14:hiddenFill xmlns:a14="http://schemas.microsoft.com/office/drawing/2010/main" xmlns="">
                 <a:solidFill>
                   <a:srgbClr val="FFFFFF"/>
                 </a:solidFill>
               </a14:hiddenFill>
             </a:ext>
             <a:ext uri="{91240B29-F687-4f45-9708-019B960494DF}">
-              <a14:hiddenLine xmlns="" xmlns:a14="http://schemas.microsoft.com/office/drawing/2010/main" w="9525">
+              <a14:hiddenLine xmlns:a14="http://schemas.microsoft.com/office/drawing/2010/main" xmlns="" w="9525">
                 <a:solidFill>
                   <a:srgbClr val="000000"/>
                 </a:solidFill>
@@ -4317,14 +4318,14 @@
           </a:ln>
           <a:extLst>
             <a:ext uri="{909E8E84-426E-40dd-AFC4-6F175D3DCCD1}">
-              <a14:hiddenFill xmlns="" xmlns:a14="http://schemas.microsoft.com/office/drawing/2010/main">
+              <a14:hiddenFill xmlns:a14="http://schemas.microsoft.com/office/drawing/2010/main" xmlns="">
                 <a:solidFill>
                   <a:srgbClr val="FFFFFF"/>
                 </a:solidFill>
               </a14:hiddenFill>
             </a:ext>
             <a:ext uri="{91240B29-F687-4f45-9708-019B960494DF}">
-              <a14:hiddenLine xmlns="" xmlns:a14="http://schemas.microsoft.com/office/drawing/2010/main" w="9525">
+              <a14:hiddenLine xmlns:a14="http://schemas.microsoft.com/office/drawing/2010/main" xmlns="" w="9525">
                 <a:solidFill>
                   <a:srgbClr val="000000"/>
                 </a:solidFill>
@@ -4749,14 +4750,14 @@
           </a:ln>
           <a:extLst>
             <a:ext uri="{909E8E84-426E-40dd-AFC4-6F175D3DCCD1}">
-              <a14:hiddenFill xmlns="" xmlns:a14="http://schemas.microsoft.com/office/drawing/2010/main">
+              <a14:hiddenFill xmlns:a14="http://schemas.microsoft.com/office/drawing/2010/main" xmlns="">
                 <a:solidFill>
                   <a:srgbClr val="FFFFFF"/>
                 </a:solidFill>
               </a14:hiddenFill>
             </a:ext>
             <a:ext uri="{91240B29-F687-4f45-9708-019B960494DF}">
-              <a14:hiddenLine xmlns="" xmlns:a14="http://schemas.microsoft.com/office/drawing/2010/main" w="9525">
+              <a14:hiddenLine xmlns:a14="http://schemas.microsoft.com/office/drawing/2010/main" xmlns="" w="9525">
                 <a:solidFill>
                   <a:srgbClr val="000000"/>
                 </a:solidFill>
@@ -4803,14 +4804,14 @@
           </a:ln>
           <a:extLst>
             <a:ext uri="{909E8E84-426E-40dd-AFC4-6F175D3DCCD1}">
-              <a14:hiddenFill xmlns="" xmlns:a14="http://schemas.microsoft.com/office/drawing/2010/main">
+              <a14:hiddenFill xmlns:a14="http://schemas.microsoft.com/office/drawing/2010/main" xmlns="">
                 <a:solidFill>
                   <a:srgbClr val="FFFFFF"/>
                 </a:solidFill>
               </a14:hiddenFill>
             </a:ext>
             <a:ext uri="{91240B29-F687-4f45-9708-019B960494DF}">
-              <a14:hiddenLine xmlns="" xmlns:a14="http://schemas.microsoft.com/office/drawing/2010/main" w="9525">
+              <a14:hiddenLine xmlns:a14="http://schemas.microsoft.com/office/drawing/2010/main" xmlns="" w="9525">
                 <a:solidFill>
                   <a:srgbClr val="000000"/>
                 </a:solidFill>
@@ -4943,14 +4944,14 @@
           </a:ln>
           <a:extLst>
             <a:ext uri="{909E8E84-426E-40dd-AFC4-6F175D3DCCD1}">
-              <a14:hiddenFill xmlns="" xmlns:a14="http://schemas.microsoft.com/office/drawing/2010/main">
+              <a14:hiddenFill xmlns:a14="http://schemas.microsoft.com/office/drawing/2010/main" xmlns="">
                 <a:solidFill>
                   <a:srgbClr val="FFFFFF"/>
                 </a:solidFill>
               </a14:hiddenFill>
             </a:ext>
             <a:ext uri="{91240B29-F687-4f45-9708-019B960494DF}">
-              <a14:hiddenLine xmlns="" xmlns:a14="http://schemas.microsoft.com/office/drawing/2010/main" w="9525">
+              <a14:hiddenLine xmlns:a14="http://schemas.microsoft.com/office/drawing/2010/main" xmlns="" w="9525">
                 <a:solidFill>
                   <a:srgbClr val="000000"/>
                 </a:solidFill>
@@ -5177,14 +5178,14 @@
           </a:ln>
           <a:extLst>
             <a:ext uri="{909E8E84-426E-40dd-AFC4-6F175D3DCCD1}">
-              <a14:hiddenFill xmlns="" xmlns:a14="http://schemas.microsoft.com/office/drawing/2010/main">
+              <a14:hiddenFill xmlns:a14="http://schemas.microsoft.com/office/drawing/2010/main" xmlns="">
                 <a:solidFill>
                   <a:srgbClr val="FFFFFF"/>
                 </a:solidFill>
               </a14:hiddenFill>
             </a:ext>
             <a:ext uri="{91240B29-F687-4f45-9708-019B960494DF}">
-              <a14:hiddenLine xmlns="" xmlns:a14="http://schemas.microsoft.com/office/drawing/2010/main" w="9525">
+              <a14:hiddenLine xmlns:a14="http://schemas.microsoft.com/office/drawing/2010/main" xmlns="" w="9525">
                 <a:solidFill>
                   <a:srgbClr val="000000"/>
                 </a:solidFill>
@@ -5286,17 +5287,17 @@
           </a:ln>
           <a:extLst>
             <a:ext uri="{FAA26D3D-D897-4be2-8F04-BA451C77F1D7}">
-              <ma14:placeholderFlag xmlns="" xmlns:ma14="http://schemas.microsoft.com/office/mac/drawingml/2011/main" val="1"/>
+              <ma14:placeholderFlag xmlns:ma14="http://schemas.microsoft.com/office/mac/drawingml/2011/main" xmlns="" val="1"/>
             </a:ext>
             <a:ext uri="{909E8E84-426E-40dd-AFC4-6F175D3DCCD1}">
-              <a14:hiddenFill xmlns="" xmlns:a14="http://schemas.microsoft.com/office/drawing/2010/main">
+              <a14:hiddenFill xmlns:a14="http://schemas.microsoft.com/office/drawing/2010/main" xmlns="">
                 <a:solidFill>
                   <a:srgbClr val="FFFFFF"/>
                 </a:solidFill>
               </a14:hiddenFill>
             </a:ext>
             <a:ext uri="{91240B29-F687-4f45-9708-019B960494DF}">
-              <a14:hiddenLine xmlns="" xmlns:a14="http://schemas.microsoft.com/office/drawing/2010/main" w="9525">
+              <a14:hiddenLine xmlns:a14="http://schemas.microsoft.com/office/drawing/2010/main" xmlns="" w="9525">
                 <a:solidFill>
                   <a:srgbClr val="000000"/>
                 </a:solidFill>
@@ -5347,17 +5348,17 @@
           </a:ln>
           <a:extLst>
             <a:ext uri="{FAA26D3D-D897-4be2-8F04-BA451C77F1D7}">
-              <ma14:placeholderFlag xmlns="" xmlns:ma14="http://schemas.microsoft.com/office/mac/drawingml/2011/main" val="1"/>
+              <ma14:placeholderFlag xmlns:ma14="http://schemas.microsoft.com/office/mac/drawingml/2011/main" xmlns="" val="1"/>
             </a:ext>
             <a:ext uri="{909E8E84-426E-40dd-AFC4-6F175D3DCCD1}">
-              <a14:hiddenFill xmlns="" xmlns:a14="http://schemas.microsoft.com/office/drawing/2010/main">
+              <a14:hiddenFill xmlns:a14="http://schemas.microsoft.com/office/drawing/2010/main" xmlns="">
                 <a:solidFill>
                   <a:srgbClr val="FFFFFF"/>
                 </a:solidFill>
               </a14:hiddenFill>
             </a:ext>
             <a:ext uri="{91240B29-F687-4f45-9708-019B960494DF}">
-              <a14:hiddenLine xmlns="" xmlns:a14="http://schemas.microsoft.com/office/drawing/2010/main" w="9525">
+              <a14:hiddenLine xmlns:a14="http://schemas.microsoft.com/office/drawing/2010/main" xmlns="" w="9525">
                 <a:solidFill>
                   <a:srgbClr val="000000"/>
                 </a:solidFill>
@@ -7538,17 +7539,17 @@
           </a:ln>
           <a:extLst>
             <a:ext uri="{FAA26D3D-D897-4be2-8F04-BA451C77F1D7}">
-              <ma14:placeholderFlag xmlns="" xmlns:ma14="http://schemas.microsoft.com/office/mac/drawingml/2011/main" val="1"/>
+              <ma14:placeholderFlag xmlns:ma14="http://schemas.microsoft.com/office/mac/drawingml/2011/main" xmlns="" val="1"/>
             </a:ext>
             <a:ext uri="{909E8E84-426E-40dd-AFC4-6F175D3DCCD1}">
-              <a14:hiddenFill xmlns="" xmlns:a14="http://schemas.microsoft.com/office/drawing/2010/main">
+              <a14:hiddenFill xmlns:a14="http://schemas.microsoft.com/office/drawing/2010/main" xmlns="">
                 <a:solidFill>
                   <a:srgbClr val="FFFFFF"/>
                 </a:solidFill>
               </a14:hiddenFill>
             </a:ext>
             <a:ext uri="{91240B29-F687-4f45-9708-019B960494DF}">
-              <a14:hiddenLine xmlns="" xmlns:a14="http://schemas.microsoft.com/office/drawing/2010/main" w="9525">
+              <a14:hiddenLine xmlns:a14="http://schemas.microsoft.com/office/drawing/2010/main" xmlns="" w="9525">
                 <a:solidFill>
                   <a:srgbClr val="000000"/>
                 </a:solidFill>
@@ -7752,17 +7753,17 @@
           </a:ln>
           <a:extLst>
             <a:ext uri="{FAA26D3D-D897-4be2-8F04-BA451C77F1D7}">
-              <ma14:placeholderFlag xmlns="" xmlns:ma14="http://schemas.microsoft.com/office/mac/drawingml/2011/main" val="1"/>
+              <ma14:placeholderFlag xmlns:ma14="http://schemas.microsoft.com/office/mac/drawingml/2011/main" xmlns="" val="1"/>
             </a:ext>
             <a:ext uri="{909E8E84-426E-40dd-AFC4-6F175D3DCCD1}">
-              <a14:hiddenFill xmlns="" xmlns:a14="http://schemas.microsoft.com/office/drawing/2010/main">
+              <a14:hiddenFill xmlns:a14="http://schemas.microsoft.com/office/drawing/2010/main" xmlns="">
                 <a:solidFill>
                   <a:srgbClr val="FFFFFF"/>
                 </a:solidFill>
               </a14:hiddenFill>
             </a:ext>
             <a:ext uri="{91240B29-F687-4f45-9708-019B960494DF}">
-              <a14:hiddenLine xmlns="" xmlns:a14="http://schemas.microsoft.com/office/drawing/2010/main" w="9525">
+              <a14:hiddenLine xmlns:a14="http://schemas.microsoft.com/office/drawing/2010/main" xmlns="" w="9525">
                 <a:solidFill>
                   <a:srgbClr val="000000"/>
                 </a:solidFill>
@@ -10244,17 +10245,17 @@
           </a:ln>
           <a:extLst>
             <a:ext uri="{FAA26D3D-D897-4be2-8F04-BA451C77F1D7}">
-              <ma14:placeholderFlag xmlns="" xmlns:ma14="http://schemas.microsoft.com/office/mac/drawingml/2011/main" val="1"/>
+              <ma14:placeholderFlag xmlns:ma14="http://schemas.microsoft.com/office/mac/drawingml/2011/main" xmlns="" val="1"/>
             </a:ext>
             <a:ext uri="{909E8E84-426E-40dd-AFC4-6F175D3DCCD1}">
-              <a14:hiddenFill xmlns="" xmlns:a14="http://schemas.microsoft.com/office/drawing/2010/main">
+              <a14:hiddenFill xmlns:a14="http://schemas.microsoft.com/office/drawing/2010/main" xmlns="">
                 <a:solidFill>
                   <a:srgbClr val="FFFFFF"/>
                 </a:solidFill>
               </a14:hiddenFill>
             </a:ext>
             <a:ext uri="{91240B29-F687-4f45-9708-019B960494DF}">
-              <a14:hiddenLine xmlns="" xmlns:a14="http://schemas.microsoft.com/office/drawing/2010/main" w="9525">
+              <a14:hiddenLine xmlns:a14="http://schemas.microsoft.com/office/drawing/2010/main" xmlns="" w="9525">
                 <a:solidFill>
                   <a:srgbClr val="000000"/>
                 </a:solidFill>
@@ -16523,6 +16524,70 @@
 </p:sld>
 </file>
 
+<file path=ppt/slides/slide21.xml><?xml version="1.0" encoding="utf-8"?>
+<p:sld xmlns:a="http://schemas.openxmlformats.org/drawingml/2006/main" xmlns:r="http://schemas.openxmlformats.org/officeDocument/2006/relationships" xmlns:p="http://schemas.openxmlformats.org/presentationml/2006/main">
+  <p:cSld>
+    <p:spTree>
+      <p:nvGrpSpPr>
+        <p:cNvPr id="1" name=""/>
+        <p:cNvGrpSpPr/>
+        <p:nvPr/>
+      </p:nvGrpSpPr>
+      <p:grpSpPr>
+        <a:xfrm>
+          <a:off x="0" y="0"/>
+          <a:ext cx="0" cy="0"/>
+          <a:chOff x="0" y="0"/>
+          <a:chExt cx="0" cy="0"/>
+        </a:xfrm>
+      </p:grpSpPr>
+      <p:sp>
+        <p:nvSpPr>
+          <p:cNvPr id="2" name="Title 1">
+            <a:extLst>
+              <a:ext uri="{FF2B5EF4-FFF2-40B4-BE49-F238E27FC236}">
+                <a16:creationId xmlns:a16="http://schemas.microsoft.com/office/drawing/2014/main" id="{D0F30FEF-43E4-C99B-0BC9-848E4DE07A5B}"/>
+              </a:ext>
+            </a:extLst>
+          </p:cNvPr>
+          <p:cNvSpPr>
+            <a:spLocks noGrp="1"/>
+          </p:cNvSpPr>
+          <p:nvPr>
+            <p:ph type="title"/>
+          </p:nvPr>
+        </p:nvSpPr>
+        <p:spPr>
+          <a:xfrm>
+            <a:off x="660400" y="3104964"/>
+            <a:ext cx="10871200" cy="648072"/>
+          </a:xfrm>
+        </p:spPr>
+        <p:txBody>
+          <a:bodyPr/>
+          <a:lstStyle/>
+          <a:p>
+            <a:pPr algn="ctr"/>
+            <a:r>
+              <a:rPr lang="en-GB" dirty="0"/>
+              <a:t>support@elixir.no</a:t>
+            </a:r>
+          </a:p>
+        </p:txBody>
+      </p:sp>
+    </p:spTree>
+    <p:extLst>
+      <p:ext uri="{BB962C8B-B14F-4D97-AF65-F5344CB8AC3E}">
+        <p14:creationId xmlns:p14="http://schemas.microsoft.com/office/powerpoint/2010/main" val="1706502223"/>
+      </p:ext>
+    </p:extLst>
+  </p:cSld>
+  <p:clrMapOvr>
+    <a:masterClrMapping/>
+  </p:clrMapOvr>
+</p:sld>
+</file>
+
 <file path=ppt/slides/slide3.xml><?xml version="1.0" encoding="utf-8"?>
 <p:sld xmlns:a="http://schemas.openxmlformats.org/drawingml/2006/main" xmlns:r="http://schemas.openxmlformats.org/officeDocument/2006/relationships" xmlns:p="http://schemas.openxmlformats.org/presentationml/2006/main">
   <p:cSld>
@@ -19081,17 +19146,17 @@
           </a:ln>
           <a:extLst>
             <a:ext uri="{FAA26D3D-D897-4be2-8F04-BA451C77F1D7}">
-              <ma14:placeholderFlag xmlns="" xmlns:ma14="http://schemas.microsoft.com/office/mac/drawingml/2011/main" val="1"/>
+              <ma14:placeholderFlag xmlns:ma14="http://schemas.microsoft.com/office/mac/drawingml/2011/main" xmlns="" val="1"/>
             </a:ext>
             <a:ext uri="{909E8E84-426E-40dd-AFC4-6F175D3DCCD1}">
-              <a14:hiddenFill xmlns="" xmlns:a14="http://schemas.microsoft.com/office/drawing/2010/main">
+              <a14:hiddenFill xmlns:a14="http://schemas.microsoft.com/office/drawing/2010/main" xmlns="">
                 <a:solidFill>
                   <a:srgbClr val="FFFFFF"/>
                 </a:solidFill>
               </a14:hiddenFill>
             </a:ext>
             <a:ext uri="{91240B29-F687-4f45-9708-019B960494DF}">
-              <a14:hiddenLine xmlns="" xmlns:a14="http://schemas.microsoft.com/office/drawing/2010/main" w="9525">
+              <a14:hiddenLine xmlns:a14="http://schemas.microsoft.com/office/drawing/2010/main" xmlns="" w="9525">
                 <a:solidFill>
                   <a:srgbClr val="000000"/>
                 </a:solidFill>
@@ -22363,17 +22428,17 @@
           </a:ln>
           <a:extLst>
             <a:ext uri="{FAA26D3D-D897-4be2-8F04-BA451C77F1D7}">
-              <ma14:placeholderFlag xmlns="" xmlns:ma14="http://schemas.microsoft.com/office/mac/drawingml/2011/main" val="1"/>
+              <ma14:placeholderFlag xmlns:ma14="http://schemas.microsoft.com/office/mac/drawingml/2011/main" xmlns="" val="1"/>
             </a:ext>
             <a:ext uri="{909E8E84-426E-40dd-AFC4-6F175D3DCCD1}">
-              <a14:hiddenFill xmlns="" xmlns:a14="http://schemas.microsoft.com/office/drawing/2010/main">
+              <a14:hiddenFill xmlns:a14="http://schemas.microsoft.com/office/drawing/2010/main" xmlns="">
                 <a:solidFill>
                   <a:srgbClr val="FFFFFF"/>
                 </a:solidFill>
               </a14:hiddenFill>
             </a:ext>
             <a:ext uri="{91240B29-F687-4f45-9708-019B960494DF}">
-              <a14:hiddenLine xmlns="" xmlns:a14="http://schemas.microsoft.com/office/drawing/2010/main" w="9525">
+              <a14:hiddenLine xmlns:a14="http://schemas.microsoft.com/office/drawing/2010/main" xmlns="" w="9525">
                 <a:solidFill>
                   <a:srgbClr val="000000"/>
                 </a:solidFill>
@@ -22582,17 +22647,17 @@
           </a:ln>
           <a:extLst>
             <a:ext uri="{FAA26D3D-D897-4be2-8F04-BA451C77F1D7}">
-              <ma14:placeholderFlag xmlns="" xmlns:ma14="http://schemas.microsoft.com/office/mac/drawingml/2011/main" val="1"/>
+              <ma14:placeholderFlag xmlns:ma14="http://schemas.microsoft.com/office/mac/drawingml/2011/main" xmlns="" val="1"/>
             </a:ext>
             <a:ext uri="{909E8E84-426E-40dd-AFC4-6F175D3DCCD1}">
-              <a14:hiddenFill xmlns="" xmlns:a14="http://schemas.microsoft.com/office/drawing/2010/main">
+              <a14:hiddenFill xmlns:a14="http://schemas.microsoft.com/office/drawing/2010/main" xmlns="">
                 <a:solidFill>
                   <a:srgbClr val="FFFFFF"/>
                 </a:solidFill>
               </a14:hiddenFill>
             </a:ext>
             <a:ext uri="{91240B29-F687-4f45-9708-019B960494DF}">
-              <a14:hiddenLine xmlns="" xmlns:a14="http://schemas.microsoft.com/office/drawing/2010/main" w="9525">
+              <a14:hiddenLine xmlns:a14="http://schemas.microsoft.com/office/drawing/2010/main" xmlns="" w="9525">
                 <a:solidFill>
                   <a:srgbClr val="000000"/>
                 </a:solidFill>

</xml_diff>